<commit_message>
removed extra copy of m9 slides from wrong folder, updated slides to add [m,n] example
</commit_message>
<xml_diff>
--- a/Slides/Module 09 React Hooks.pptx
+++ b/Slides/Module 09 React Hooks.pptx
@@ -399,375 +399,6 @@
 
 <file path=ppt/changesInfos/changesInfo1.xml><?xml version="1.0" encoding="utf-8"?>
 <pc:chgInfo xmlns:a="http://schemas.openxmlformats.org/drawingml/2006/main" xmlns:r="http://schemas.openxmlformats.org/officeDocument/2006/relationships" xmlns:ac="http://schemas.microsoft.com/office/drawing/2013/main/command" xmlns:pc="http://schemas.microsoft.com/office/powerpoint/2013/main/command">
-  <pc:docChgLst>
-    <pc:chgData name="Mitchell Wand" userId="de9b44c55c049659" providerId="LiveId" clId="{A3C5E289-FD0A-4A2C-B775-A66EDB85EC8C}"/>
-    <pc:docChg chg="addSld delSld modSld delSection modSection">
-      <pc:chgData name="Mitchell Wand" userId="de9b44c55c049659" providerId="LiveId" clId="{A3C5E289-FD0A-4A2C-B775-A66EDB85EC8C}" dt="2023-09-21T19:08:19.001" v="5"/>
-      <pc:docMkLst>
-        <pc:docMk/>
-      </pc:docMkLst>
-      <pc:sldChg chg="del">
-        <pc:chgData name="Mitchell Wand" userId="de9b44c55c049659" providerId="LiveId" clId="{A3C5E289-FD0A-4A2C-B775-A66EDB85EC8C}" dt="2023-09-21T19:05:48.983" v="0" actId="18676"/>
-        <pc:sldMkLst>
-          <pc:docMk/>
-          <pc:sldMk cId="0" sldId="256"/>
-        </pc:sldMkLst>
-      </pc:sldChg>
-      <pc:sldChg chg="del">
-        <pc:chgData name="Mitchell Wand" userId="de9b44c55c049659" providerId="LiveId" clId="{A3C5E289-FD0A-4A2C-B775-A66EDB85EC8C}" dt="2023-09-21T19:05:48.983" v="0" actId="18676"/>
-        <pc:sldMkLst>
-          <pc:docMk/>
-          <pc:sldMk cId="0" sldId="257"/>
-        </pc:sldMkLst>
-      </pc:sldChg>
-      <pc:sldChg chg="del">
-        <pc:chgData name="Mitchell Wand" userId="de9b44c55c049659" providerId="LiveId" clId="{A3C5E289-FD0A-4A2C-B775-A66EDB85EC8C}" dt="2023-09-21T19:05:48.983" v="0" actId="18676"/>
-        <pc:sldMkLst>
-          <pc:docMk/>
-          <pc:sldMk cId="0" sldId="258"/>
-        </pc:sldMkLst>
-      </pc:sldChg>
-      <pc:sldChg chg="del">
-        <pc:chgData name="Mitchell Wand" userId="de9b44c55c049659" providerId="LiveId" clId="{A3C5E289-FD0A-4A2C-B775-A66EDB85EC8C}" dt="2023-09-21T19:05:48.983" v="0" actId="18676"/>
-        <pc:sldMkLst>
-          <pc:docMk/>
-          <pc:sldMk cId="0" sldId="259"/>
-        </pc:sldMkLst>
-      </pc:sldChg>
-      <pc:sldChg chg="del">
-        <pc:chgData name="Mitchell Wand" userId="de9b44c55c049659" providerId="LiveId" clId="{A3C5E289-FD0A-4A2C-B775-A66EDB85EC8C}" dt="2023-09-21T19:05:48.983" v="0" actId="18676"/>
-        <pc:sldMkLst>
-          <pc:docMk/>
-          <pc:sldMk cId="0" sldId="260"/>
-        </pc:sldMkLst>
-      </pc:sldChg>
-      <pc:sldChg chg="del">
-        <pc:chgData name="Mitchell Wand" userId="de9b44c55c049659" providerId="LiveId" clId="{A3C5E289-FD0A-4A2C-B775-A66EDB85EC8C}" dt="2023-09-21T19:05:48.983" v="0" actId="18676"/>
-        <pc:sldMkLst>
-          <pc:docMk/>
-          <pc:sldMk cId="0" sldId="262"/>
-        </pc:sldMkLst>
-      </pc:sldChg>
-      <pc:sldChg chg="del">
-        <pc:chgData name="Mitchell Wand" userId="de9b44c55c049659" providerId="LiveId" clId="{A3C5E289-FD0A-4A2C-B775-A66EDB85EC8C}" dt="2023-09-21T19:05:48.983" v="0" actId="18676"/>
-        <pc:sldMkLst>
-          <pc:docMk/>
-          <pc:sldMk cId="0" sldId="263"/>
-        </pc:sldMkLst>
-      </pc:sldChg>
-      <pc:sldChg chg="del">
-        <pc:chgData name="Mitchell Wand" userId="de9b44c55c049659" providerId="LiveId" clId="{A3C5E289-FD0A-4A2C-B775-A66EDB85EC8C}" dt="2023-09-21T19:05:48.983" v="0" actId="18676"/>
-        <pc:sldMkLst>
-          <pc:docMk/>
-          <pc:sldMk cId="0" sldId="264"/>
-        </pc:sldMkLst>
-      </pc:sldChg>
-      <pc:sldChg chg="del">
-        <pc:chgData name="Mitchell Wand" userId="de9b44c55c049659" providerId="LiveId" clId="{A3C5E289-FD0A-4A2C-B775-A66EDB85EC8C}" dt="2023-09-21T19:05:48.983" v="0" actId="18676"/>
-        <pc:sldMkLst>
-          <pc:docMk/>
-          <pc:sldMk cId="0" sldId="265"/>
-        </pc:sldMkLst>
-      </pc:sldChg>
-      <pc:sldChg chg="del">
-        <pc:chgData name="Mitchell Wand" userId="de9b44c55c049659" providerId="LiveId" clId="{A3C5E289-FD0A-4A2C-B775-A66EDB85EC8C}" dt="2023-09-21T19:05:48.983" v="0" actId="18676"/>
-        <pc:sldMkLst>
-          <pc:docMk/>
-          <pc:sldMk cId="0" sldId="266"/>
-        </pc:sldMkLst>
-      </pc:sldChg>
-      <pc:sldChg chg="del">
-        <pc:chgData name="Mitchell Wand" userId="de9b44c55c049659" providerId="LiveId" clId="{A3C5E289-FD0A-4A2C-B775-A66EDB85EC8C}" dt="2023-09-21T19:05:48.983" v="0" actId="18676"/>
-        <pc:sldMkLst>
-          <pc:docMk/>
-          <pc:sldMk cId="0" sldId="267"/>
-        </pc:sldMkLst>
-      </pc:sldChg>
-      <pc:sldChg chg="del">
-        <pc:chgData name="Mitchell Wand" userId="de9b44c55c049659" providerId="LiveId" clId="{A3C5E289-FD0A-4A2C-B775-A66EDB85EC8C}" dt="2023-09-21T19:05:48.983" v="0" actId="18676"/>
-        <pc:sldMkLst>
-          <pc:docMk/>
-          <pc:sldMk cId="0" sldId="268"/>
-        </pc:sldMkLst>
-      </pc:sldChg>
-      <pc:sldChg chg="del">
-        <pc:chgData name="Mitchell Wand" userId="de9b44c55c049659" providerId="LiveId" clId="{A3C5E289-FD0A-4A2C-B775-A66EDB85EC8C}" dt="2023-09-21T19:05:48.983" v="0" actId="18676"/>
-        <pc:sldMkLst>
-          <pc:docMk/>
-          <pc:sldMk cId="0" sldId="269"/>
-        </pc:sldMkLst>
-      </pc:sldChg>
-      <pc:sldChg chg="del">
-        <pc:chgData name="Mitchell Wand" userId="de9b44c55c049659" providerId="LiveId" clId="{A3C5E289-FD0A-4A2C-B775-A66EDB85EC8C}" dt="2023-09-21T19:05:48.983" v="0" actId="18676"/>
-        <pc:sldMkLst>
-          <pc:docMk/>
-          <pc:sldMk cId="0" sldId="270"/>
-        </pc:sldMkLst>
-      </pc:sldChg>
-      <pc:sldChg chg="del">
-        <pc:chgData name="Mitchell Wand" userId="de9b44c55c049659" providerId="LiveId" clId="{A3C5E289-FD0A-4A2C-B775-A66EDB85EC8C}" dt="2023-09-21T19:05:48.983" v="0" actId="18676"/>
-        <pc:sldMkLst>
-          <pc:docMk/>
-          <pc:sldMk cId="0" sldId="271"/>
-        </pc:sldMkLst>
-      </pc:sldChg>
-      <pc:sldChg chg="del">
-        <pc:chgData name="Mitchell Wand" userId="de9b44c55c049659" providerId="LiveId" clId="{A3C5E289-FD0A-4A2C-B775-A66EDB85EC8C}" dt="2023-09-21T19:05:48.983" v="0" actId="18676"/>
-        <pc:sldMkLst>
-          <pc:docMk/>
-          <pc:sldMk cId="0" sldId="273"/>
-        </pc:sldMkLst>
-      </pc:sldChg>
-      <pc:sldChg chg="del">
-        <pc:chgData name="Mitchell Wand" userId="de9b44c55c049659" providerId="LiveId" clId="{A3C5E289-FD0A-4A2C-B775-A66EDB85EC8C}" dt="2023-09-21T19:05:48.983" v="0" actId="18676"/>
-        <pc:sldMkLst>
-          <pc:docMk/>
-          <pc:sldMk cId="0" sldId="274"/>
-        </pc:sldMkLst>
-      </pc:sldChg>
-      <pc:sldChg chg="del">
-        <pc:chgData name="Mitchell Wand" userId="de9b44c55c049659" providerId="LiveId" clId="{A3C5E289-FD0A-4A2C-B775-A66EDB85EC8C}" dt="2023-09-21T19:05:48.983" v="0" actId="18676"/>
-        <pc:sldMkLst>
-          <pc:docMk/>
-          <pc:sldMk cId="0" sldId="275"/>
-        </pc:sldMkLst>
-      </pc:sldChg>
-      <pc:sldChg chg="del">
-        <pc:chgData name="Mitchell Wand" userId="de9b44c55c049659" providerId="LiveId" clId="{A3C5E289-FD0A-4A2C-B775-A66EDB85EC8C}" dt="2023-09-21T19:05:48.983" v="0" actId="18676"/>
-        <pc:sldMkLst>
-          <pc:docMk/>
-          <pc:sldMk cId="0" sldId="278"/>
-        </pc:sldMkLst>
-      </pc:sldChg>
-      <pc:sldChg chg="del">
-        <pc:chgData name="Mitchell Wand" userId="de9b44c55c049659" providerId="LiveId" clId="{A3C5E289-FD0A-4A2C-B775-A66EDB85EC8C}" dt="2023-09-21T19:05:48.983" v="0" actId="18676"/>
-        <pc:sldMkLst>
-          <pc:docMk/>
-          <pc:sldMk cId="0" sldId="279"/>
-        </pc:sldMkLst>
-      </pc:sldChg>
-      <pc:sldChg chg="add del">
-        <pc:chgData name="Mitchell Wand" userId="de9b44c55c049659" providerId="LiveId" clId="{A3C5E289-FD0A-4A2C-B775-A66EDB85EC8C}" dt="2023-09-21T19:07:12.046" v="1"/>
-        <pc:sldMkLst>
-          <pc:docMk/>
-          <pc:sldMk cId="0" sldId="286"/>
-        </pc:sldMkLst>
-      </pc:sldChg>
-      <pc:sldChg chg="add del">
-        <pc:chgData name="Mitchell Wand" userId="de9b44c55c049659" providerId="LiveId" clId="{A3C5E289-FD0A-4A2C-B775-A66EDB85EC8C}" dt="2023-09-21T19:07:12.046" v="1"/>
-        <pc:sldMkLst>
-          <pc:docMk/>
-          <pc:sldMk cId="0" sldId="288"/>
-        </pc:sldMkLst>
-      </pc:sldChg>
-      <pc:sldChg chg="add del">
-        <pc:chgData name="Mitchell Wand" userId="de9b44c55c049659" providerId="LiveId" clId="{A3C5E289-FD0A-4A2C-B775-A66EDB85EC8C}" dt="2023-09-21T19:07:12.046" v="1"/>
-        <pc:sldMkLst>
-          <pc:docMk/>
-          <pc:sldMk cId="0" sldId="289"/>
-        </pc:sldMkLst>
-      </pc:sldChg>
-      <pc:sldChg chg="add del">
-        <pc:chgData name="Mitchell Wand" userId="de9b44c55c049659" providerId="LiveId" clId="{A3C5E289-FD0A-4A2C-B775-A66EDB85EC8C}" dt="2023-09-21T19:07:12.046" v="1"/>
-        <pc:sldMkLst>
-          <pc:docMk/>
-          <pc:sldMk cId="0" sldId="290"/>
-        </pc:sldMkLst>
-      </pc:sldChg>
-      <pc:sldChg chg="add del">
-        <pc:chgData name="Mitchell Wand" userId="de9b44c55c049659" providerId="LiveId" clId="{A3C5E289-FD0A-4A2C-B775-A66EDB85EC8C}" dt="2023-09-21T19:07:12.046" v="1"/>
-        <pc:sldMkLst>
-          <pc:docMk/>
-          <pc:sldMk cId="0" sldId="291"/>
-        </pc:sldMkLst>
-      </pc:sldChg>
-      <pc:sldChg chg="add del">
-        <pc:chgData name="Mitchell Wand" userId="de9b44c55c049659" providerId="LiveId" clId="{A3C5E289-FD0A-4A2C-B775-A66EDB85EC8C}" dt="2023-09-21T19:07:12.046" v="1"/>
-        <pc:sldMkLst>
-          <pc:docMk/>
-          <pc:sldMk cId="0" sldId="292"/>
-        </pc:sldMkLst>
-      </pc:sldChg>
-      <pc:sldChg chg="add del">
-        <pc:chgData name="Mitchell Wand" userId="de9b44c55c049659" providerId="LiveId" clId="{A3C5E289-FD0A-4A2C-B775-A66EDB85EC8C}" dt="2023-09-21T19:07:12.046" v="1"/>
-        <pc:sldMkLst>
-          <pc:docMk/>
-          <pc:sldMk cId="0" sldId="293"/>
-        </pc:sldMkLst>
-      </pc:sldChg>
-      <pc:sldChg chg="del">
-        <pc:chgData name="Mitchell Wand" userId="de9b44c55c049659" providerId="LiveId" clId="{A3C5E289-FD0A-4A2C-B775-A66EDB85EC8C}" dt="2023-09-21T19:05:48.983" v="0" actId="18676"/>
-        <pc:sldMkLst>
-          <pc:docMk/>
-          <pc:sldMk cId="0" sldId="294"/>
-        </pc:sldMkLst>
-      </pc:sldChg>
-      <pc:sldChg chg="del">
-        <pc:chgData name="Mitchell Wand" userId="de9b44c55c049659" providerId="LiveId" clId="{A3C5E289-FD0A-4A2C-B775-A66EDB85EC8C}" dt="2023-09-21T19:05:48.983" v="0" actId="18676"/>
-        <pc:sldMkLst>
-          <pc:docMk/>
-          <pc:sldMk cId="2813158976" sldId="296"/>
-        </pc:sldMkLst>
-      </pc:sldChg>
-      <pc:sldChg chg="add del">
-        <pc:chgData name="Mitchell Wand" userId="de9b44c55c049659" providerId="LiveId" clId="{A3C5E289-FD0A-4A2C-B775-A66EDB85EC8C}" dt="2023-09-21T19:07:12.046" v="1"/>
-        <pc:sldMkLst>
-          <pc:docMk/>
-          <pc:sldMk cId="2690522714" sldId="386"/>
-        </pc:sldMkLst>
-      </pc:sldChg>
-      <pc:sldChg chg="del">
-        <pc:chgData name="Mitchell Wand" userId="de9b44c55c049659" providerId="LiveId" clId="{A3C5E289-FD0A-4A2C-B775-A66EDB85EC8C}" dt="2023-09-21T19:05:48.983" v="0" actId="18676"/>
-        <pc:sldMkLst>
-          <pc:docMk/>
-          <pc:sldMk cId="1712348606" sldId="387"/>
-        </pc:sldMkLst>
-      </pc:sldChg>
-      <pc:sldChg chg="del">
-        <pc:chgData name="Mitchell Wand" userId="de9b44c55c049659" providerId="LiveId" clId="{A3C5E289-FD0A-4A2C-B775-A66EDB85EC8C}" dt="2023-09-21T19:05:48.983" v="0" actId="18676"/>
-        <pc:sldMkLst>
-          <pc:docMk/>
-          <pc:sldMk cId="4105083793" sldId="388"/>
-        </pc:sldMkLst>
-      </pc:sldChg>
-      <pc:sldChg chg="del">
-        <pc:chgData name="Mitchell Wand" userId="de9b44c55c049659" providerId="LiveId" clId="{A3C5E289-FD0A-4A2C-B775-A66EDB85EC8C}" dt="2023-09-21T19:05:48.983" v="0" actId="18676"/>
-        <pc:sldMkLst>
-          <pc:docMk/>
-          <pc:sldMk cId="2457656915" sldId="389"/>
-        </pc:sldMkLst>
-      </pc:sldChg>
-      <pc:sldChg chg="del">
-        <pc:chgData name="Mitchell Wand" userId="de9b44c55c049659" providerId="LiveId" clId="{A3C5E289-FD0A-4A2C-B775-A66EDB85EC8C}" dt="2023-09-21T19:05:48.983" v="0" actId="18676"/>
-        <pc:sldMkLst>
-          <pc:docMk/>
-          <pc:sldMk cId="4204086104" sldId="390"/>
-        </pc:sldMkLst>
-      </pc:sldChg>
-      <pc:sldChg chg="del">
-        <pc:chgData name="Mitchell Wand" userId="de9b44c55c049659" providerId="LiveId" clId="{A3C5E289-FD0A-4A2C-B775-A66EDB85EC8C}" dt="2023-09-21T19:05:48.983" v="0" actId="18676"/>
-        <pc:sldMkLst>
-          <pc:docMk/>
-          <pc:sldMk cId="3646889748" sldId="391"/>
-        </pc:sldMkLst>
-      </pc:sldChg>
-      <pc:sldChg chg="del">
-        <pc:chgData name="Mitchell Wand" userId="de9b44c55c049659" providerId="LiveId" clId="{A3C5E289-FD0A-4A2C-B775-A66EDB85EC8C}" dt="2023-09-21T19:05:48.983" v="0" actId="18676"/>
-        <pc:sldMkLst>
-          <pc:docMk/>
-          <pc:sldMk cId="2936127610" sldId="393"/>
-        </pc:sldMkLst>
-      </pc:sldChg>
-      <pc:sldChg chg="del">
-        <pc:chgData name="Mitchell Wand" userId="de9b44c55c049659" providerId="LiveId" clId="{A3C5E289-FD0A-4A2C-B775-A66EDB85EC8C}" dt="2023-09-21T19:05:48.983" v="0" actId="18676"/>
-        <pc:sldMkLst>
-          <pc:docMk/>
-          <pc:sldMk cId="3959368631" sldId="395"/>
-        </pc:sldMkLst>
-      </pc:sldChg>
-      <pc:sldChg chg="del">
-        <pc:chgData name="Mitchell Wand" userId="de9b44c55c049659" providerId="LiveId" clId="{A3C5E289-FD0A-4A2C-B775-A66EDB85EC8C}" dt="2023-09-21T19:05:48.983" v="0" actId="18676"/>
-        <pc:sldMkLst>
-          <pc:docMk/>
-          <pc:sldMk cId="731707150" sldId="396"/>
-        </pc:sldMkLst>
-      </pc:sldChg>
-      <pc:sldChg chg="del">
-        <pc:chgData name="Mitchell Wand" userId="de9b44c55c049659" providerId="LiveId" clId="{A3C5E289-FD0A-4A2C-B775-A66EDB85EC8C}" dt="2023-09-21T19:05:48.983" v="0" actId="18676"/>
-        <pc:sldMkLst>
-          <pc:docMk/>
-          <pc:sldMk cId="448131492" sldId="397"/>
-        </pc:sldMkLst>
-      </pc:sldChg>
-      <pc:sldChg chg="del">
-        <pc:chgData name="Mitchell Wand" userId="de9b44c55c049659" providerId="LiveId" clId="{A3C5E289-FD0A-4A2C-B775-A66EDB85EC8C}" dt="2023-09-21T19:05:48.983" v="0" actId="18676"/>
-        <pc:sldMkLst>
-          <pc:docMk/>
-          <pc:sldMk cId="2865064717" sldId="398"/>
-        </pc:sldMkLst>
-      </pc:sldChg>
-      <pc:sldChg chg="del">
-        <pc:chgData name="Mitchell Wand" userId="de9b44c55c049659" providerId="LiveId" clId="{A3C5E289-FD0A-4A2C-B775-A66EDB85EC8C}" dt="2023-09-21T19:05:48.983" v="0" actId="18676"/>
-        <pc:sldMkLst>
-          <pc:docMk/>
-          <pc:sldMk cId="406903797" sldId="399"/>
-        </pc:sldMkLst>
-      </pc:sldChg>
-      <pc:sldChg chg="del">
-        <pc:chgData name="Mitchell Wand" userId="de9b44c55c049659" providerId="LiveId" clId="{A3C5E289-FD0A-4A2C-B775-A66EDB85EC8C}" dt="2023-09-21T19:05:48.983" v="0" actId="18676"/>
-        <pc:sldMkLst>
-          <pc:docMk/>
-          <pc:sldMk cId="1631386980" sldId="400"/>
-        </pc:sldMkLst>
-      </pc:sldChg>
-      <pc:sldChg chg="del">
-        <pc:chgData name="Mitchell Wand" userId="de9b44c55c049659" providerId="LiveId" clId="{A3C5E289-FD0A-4A2C-B775-A66EDB85EC8C}" dt="2023-09-21T19:05:48.983" v="0" actId="18676"/>
-        <pc:sldMkLst>
-          <pc:docMk/>
-          <pc:sldMk cId="581266231" sldId="401"/>
-        </pc:sldMkLst>
-      </pc:sldChg>
-      <pc:sldChg chg="del">
-        <pc:chgData name="Mitchell Wand" userId="de9b44c55c049659" providerId="LiveId" clId="{A3C5E289-FD0A-4A2C-B775-A66EDB85EC8C}" dt="2023-09-21T19:05:48.983" v="0" actId="18676"/>
-        <pc:sldMkLst>
-          <pc:docMk/>
-          <pc:sldMk cId="1352059909" sldId="402"/>
-        </pc:sldMkLst>
-      </pc:sldChg>
-      <pc:sldChg chg="del">
-        <pc:chgData name="Mitchell Wand" userId="de9b44c55c049659" providerId="LiveId" clId="{A3C5E289-FD0A-4A2C-B775-A66EDB85EC8C}" dt="2023-09-21T19:05:48.983" v="0" actId="18676"/>
-        <pc:sldMkLst>
-          <pc:docMk/>
-          <pc:sldMk cId="424888832" sldId="403"/>
-        </pc:sldMkLst>
-      </pc:sldChg>
-      <pc:sldChg chg="modSp mod">
-        <pc:chgData name="Mitchell Wand" userId="de9b44c55c049659" providerId="LiveId" clId="{A3C5E289-FD0A-4A2C-B775-A66EDB85EC8C}" dt="2023-09-21T19:08:02.826" v="3"/>
-        <pc:sldMkLst>
-          <pc:docMk/>
-          <pc:sldMk cId="2060496032" sldId="405"/>
-        </pc:sldMkLst>
-        <pc:spChg chg="mod">
-          <ac:chgData name="Mitchell Wand" userId="de9b44c55c049659" providerId="LiveId" clId="{A3C5E289-FD0A-4A2C-B775-A66EDB85EC8C}" dt="2023-09-21T19:08:02.826" v="3"/>
-          <ac:spMkLst>
-            <pc:docMk/>
-            <pc:sldMk cId="2060496032" sldId="405"/>
-            <ac:spMk id="3" creationId="{9BEC0C84-159D-289A-AB37-71EDCED09F3D}"/>
-          </ac:spMkLst>
-        </pc:spChg>
-      </pc:sldChg>
-      <pc:sldChg chg="modSp mod">
-        <pc:chgData name="Mitchell Wand" userId="de9b44c55c049659" providerId="LiveId" clId="{A3C5E289-FD0A-4A2C-B775-A66EDB85EC8C}" dt="2023-09-21T19:08:19.001" v="5"/>
-        <pc:sldMkLst>
-          <pc:docMk/>
-          <pc:sldMk cId="2363062081" sldId="425"/>
-        </pc:sldMkLst>
-        <pc:spChg chg="mod">
-          <ac:chgData name="Mitchell Wand" userId="de9b44c55c049659" providerId="LiveId" clId="{A3C5E289-FD0A-4A2C-B775-A66EDB85EC8C}" dt="2023-09-21T19:08:19.001" v="5"/>
-          <ac:spMkLst>
-            <pc:docMk/>
-            <pc:sldMk cId="2363062081" sldId="425"/>
-            <ac:spMk id="3" creationId="{9BEC0C84-159D-289A-AB37-71EDCED09F3D}"/>
-          </ac:spMkLst>
-        </pc:spChg>
-      </pc:sldChg>
-      <pc:sldMasterChg chg="delSldLayout">
-        <pc:chgData name="Mitchell Wand" userId="de9b44c55c049659" providerId="LiveId" clId="{A3C5E289-FD0A-4A2C-B775-A66EDB85EC8C}" dt="2023-09-21T19:05:48.983" v="0" actId="18676"/>
-        <pc:sldMasterMkLst>
-          <pc:docMk/>
-          <pc:sldMasterMk cId="0" sldId="2147483648"/>
-        </pc:sldMasterMkLst>
-        <pc:sldLayoutChg chg="del">
-          <pc:chgData name="Mitchell Wand" userId="de9b44c55c049659" providerId="LiveId" clId="{A3C5E289-FD0A-4A2C-B775-A66EDB85EC8C}" dt="2023-09-21T19:05:48.983" v="0" actId="18676"/>
-          <pc:sldLayoutMkLst>
-            <pc:docMk/>
-            <pc:sldMasterMk cId="0" sldId="2147483648"/>
-            <pc:sldLayoutMk cId="0" sldId="2147483652"/>
-          </pc:sldLayoutMkLst>
-        </pc:sldLayoutChg>
-      </pc:sldMasterChg>
-    </pc:docChg>
-  </pc:docChgLst>
   <pc:docChgLst>
     <pc:chgData name="Mitchell Wand" userId="de9b44c55c049659" providerId="LiveId" clId="{4E8951AA-E15D-42A6-A3F0-2BF2BA009931}"/>
     <pc:docChg chg="undo custSel addSld delSld modSld modSection">
@@ -2311,6 +1942,375 @@
     </pc:docChg>
   </pc:docChgLst>
   <pc:docChgLst>
+    <pc:chgData name="Mitchell Wand" userId="de9b44c55c049659" providerId="LiveId" clId="{A3C5E289-FD0A-4A2C-B775-A66EDB85EC8C}"/>
+    <pc:docChg chg="addSld delSld modSld delSection modSection">
+      <pc:chgData name="Mitchell Wand" userId="de9b44c55c049659" providerId="LiveId" clId="{A3C5E289-FD0A-4A2C-B775-A66EDB85EC8C}" dt="2023-09-21T19:08:19.001" v="5"/>
+      <pc:docMkLst>
+        <pc:docMk/>
+      </pc:docMkLst>
+      <pc:sldChg chg="del">
+        <pc:chgData name="Mitchell Wand" userId="de9b44c55c049659" providerId="LiveId" clId="{A3C5E289-FD0A-4A2C-B775-A66EDB85EC8C}" dt="2023-09-21T19:05:48.983" v="0" actId="18676"/>
+        <pc:sldMkLst>
+          <pc:docMk/>
+          <pc:sldMk cId="0" sldId="256"/>
+        </pc:sldMkLst>
+      </pc:sldChg>
+      <pc:sldChg chg="del">
+        <pc:chgData name="Mitchell Wand" userId="de9b44c55c049659" providerId="LiveId" clId="{A3C5E289-FD0A-4A2C-B775-A66EDB85EC8C}" dt="2023-09-21T19:05:48.983" v="0" actId="18676"/>
+        <pc:sldMkLst>
+          <pc:docMk/>
+          <pc:sldMk cId="0" sldId="257"/>
+        </pc:sldMkLst>
+      </pc:sldChg>
+      <pc:sldChg chg="del">
+        <pc:chgData name="Mitchell Wand" userId="de9b44c55c049659" providerId="LiveId" clId="{A3C5E289-FD0A-4A2C-B775-A66EDB85EC8C}" dt="2023-09-21T19:05:48.983" v="0" actId="18676"/>
+        <pc:sldMkLst>
+          <pc:docMk/>
+          <pc:sldMk cId="0" sldId="258"/>
+        </pc:sldMkLst>
+      </pc:sldChg>
+      <pc:sldChg chg="del">
+        <pc:chgData name="Mitchell Wand" userId="de9b44c55c049659" providerId="LiveId" clId="{A3C5E289-FD0A-4A2C-B775-A66EDB85EC8C}" dt="2023-09-21T19:05:48.983" v="0" actId="18676"/>
+        <pc:sldMkLst>
+          <pc:docMk/>
+          <pc:sldMk cId="0" sldId="259"/>
+        </pc:sldMkLst>
+      </pc:sldChg>
+      <pc:sldChg chg="del">
+        <pc:chgData name="Mitchell Wand" userId="de9b44c55c049659" providerId="LiveId" clId="{A3C5E289-FD0A-4A2C-B775-A66EDB85EC8C}" dt="2023-09-21T19:05:48.983" v="0" actId="18676"/>
+        <pc:sldMkLst>
+          <pc:docMk/>
+          <pc:sldMk cId="0" sldId="260"/>
+        </pc:sldMkLst>
+      </pc:sldChg>
+      <pc:sldChg chg="del">
+        <pc:chgData name="Mitchell Wand" userId="de9b44c55c049659" providerId="LiveId" clId="{A3C5E289-FD0A-4A2C-B775-A66EDB85EC8C}" dt="2023-09-21T19:05:48.983" v="0" actId="18676"/>
+        <pc:sldMkLst>
+          <pc:docMk/>
+          <pc:sldMk cId="0" sldId="262"/>
+        </pc:sldMkLst>
+      </pc:sldChg>
+      <pc:sldChg chg="del">
+        <pc:chgData name="Mitchell Wand" userId="de9b44c55c049659" providerId="LiveId" clId="{A3C5E289-FD0A-4A2C-B775-A66EDB85EC8C}" dt="2023-09-21T19:05:48.983" v="0" actId="18676"/>
+        <pc:sldMkLst>
+          <pc:docMk/>
+          <pc:sldMk cId="0" sldId="263"/>
+        </pc:sldMkLst>
+      </pc:sldChg>
+      <pc:sldChg chg="del">
+        <pc:chgData name="Mitchell Wand" userId="de9b44c55c049659" providerId="LiveId" clId="{A3C5E289-FD0A-4A2C-B775-A66EDB85EC8C}" dt="2023-09-21T19:05:48.983" v="0" actId="18676"/>
+        <pc:sldMkLst>
+          <pc:docMk/>
+          <pc:sldMk cId="0" sldId="264"/>
+        </pc:sldMkLst>
+      </pc:sldChg>
+      <pc:sldChg chg="del">
+        <pc:chgData name="Mitchell Wand" userId="de9b44c55c049659" providerId="LiveId" clId="{A3C5E289-FD0A-4A2C-B775-A66EDB85EC8C}" dt="2023-09-21T19:05:48.983" v="0" actId="18676"/>
+        <pc:sldMkLst>
+          <pc:docMk/>
+          <pc:sldMk cId="0" sldId="265"/>
+        </pc:sldMkLst>
+      </pc:sldChg>
+      <pc:sldChg chg="del">
+        <pc:chgData name="Mitchell Wand" userId="de9b44c55c049659" providerId="LiveId" clId="{A3C5E289-FD0A-4A2C-B775-A66EDB85EC8C}" dt="2023-09-21T19:05:48.983" v="0" actId="18676"/>
+        <pc:sldMkLst>
+          <pc:docMk/>
+          <pc:sldMk cId="0" sldId="266"/>
+        </pc:sldMkLst>
+      </pc:sldChg>
+      <pc:sldChg chg="del">
+        <pc:chgData name="Mitchell Wand" userId="de9b44c55c049659" providerId="LiveId" clId="{A3C5E289-FD0A-4A2C-B775-A66EDB85EC8C}" dt="2023-09-21T19:05:48.983" v="0" actId="18676"/>
+        <pc:sldMkLst>
+          <pc:docMk/>
+          <pc:sldMk cId="0" sldId="267"/>
+        </pc:sldMkLst>
+      </pc:sldChg>
+      <pc:sldChg chg="del">
+        <pc:chgData name="Mitchell Wand" userId="de9b44c55c049659" providerId="LiveId" clId="{A3C5E289-FD0A-4A2C-B775-A66EDB85EC8C}" dt="2023-09-21T19:05:48.983" v="0" actId="18676"/>
+        <pc:sldMkLst>
+          <pc:docMk/>
+          <pc:sldMk cId="0" sldId="268"/>
+        </pc:sldMkLst>
+      </pc:sldChg>
+      <pc:sldChg chg="del">
+        <pc:chgData name="Mitchell Wand" userId="de9b44c55c049659" providerId="LiveId" clId="{A3C5E289-FD0A-4A2C-B775-A66EDB85EC8C}" dt="2023-09-21T19:05:48.983" v="0" actId="18676"/>
+        <pc:sldMkLst>
+          <pc:docMk/>
+          <pc:sldMk cId="0" sldId="269"/>
+        </pc:sldMkLst>
+      </pc:sldChg>
+      <pc:sldChg chg="del">
+        <pc:chgData name="Mitchell Wand" userId="de9b44c55c049659" providerId="LiveId" clId="{A3C5E289-FD0A-4A2C-B775-A66EDB85EC8C}" dt="2023-09-21T19:05:48.983" v="0" actId="18676"/>
+        <pc:sldMkLst>
+          <pc:docMk/>
+          <pc:sldMk cId="0" sldId="270"/>
+        </pc:sldMkLst>
+      </pc:sldChg>
+      <pc:sldChg chg="del">
+        <pc:chgData name="Mitchell Wand" userId="de9b44c55c049659" providerId="LiveId" clId="{A3C5E289-FD0A-4A2C-B775-A66EDB85EC8C}" dt="2023-09-21T19:05:48.983" v="0" actId="18676"/>
+        <pc:sldMkLst>
+          <pc:docMk/>
+          <pc:sldMk cId="0" sldId="271"/>
+        </pc:sldMkLst>
+      </pc:sldChg>
+      <pc:sldChg chg="del">
+        <pc:chgData name="Mitchell Wand" userId="de9b44c55c049659" providerId="LiveId" clId="{A3C5E289-FD0A-4A2C-B775-A66EDB85EC8C}" dt="2023-09-21T19:05:48.983" v="0" actId="18676"/>
+        <pc:sldMkLst>
+          <pc:docMk/>
+          <pc:sldMk cId="0" sldId="273"/>
+        </pc:sldMkLst>
+      </pc:sldChg>
+      <pc:sldChg chg="del">
+        <pc:chgData name="Mitchell Wand" userId="de9b44c55c049659" providerId="LiveId" clId="{A3C5E289-FD0A-4A2C-B775-A66EDB85EC8C}" dt="2023-09-21T19:05:48.983" v="0" actId="18676"/>
+        <pc:sldMkLst>
+          <pc:docMk/>
+          <pc:sldMk cId="0" sldId="274"/>
+        </pc:sldMkLst>
+      </pc:sldChg>
+      <pc:sldChg chg="del">
+        <pc:chgData name="Mitchell Wand" userId="de9b44c55c049659" providerId="LiveId" clId="{A3C5E289-FD0A-4A2C-B775-A66EDB85EC8C}" dt="2023-09-21T19:05:48.983" v="0" actId="18676"/>
+        <pc:sldMkLst>
+          <pc:docMk/>
+          <pc:sldMk cId="0" sldId="275"/>
+        </pc:sldMkLst>
+      </pc:sldChg>
+      <pc:sldChg chg="del">
+        <pc:chgData name="Mitchell Wand" userId="de9b44c55c049659" providerId="LiveId" clId="{A3C5E289-FD0A-4A2C-B775-A66EDB85EC8C}" dt="2023-09-21T19:05:48.983" v="0" actId="18676"/>
+        <pc:sldMkLst>
+          <pc:docMk/>
+          <pc:sldMk cId="0" sldId="278"/>
+        </pc:sldMkLst>
+      </pc:sldChg>
+      <pc:sldChg chg="del">
+        <pc:chgData name="Mitchell Wand" userId="de9b44c55c049659" providerId="LiveId" clId="{A3C5E289-FD0A-4A2C-B775-A66EDB85EC8C}" dt="2023-09-21T19:05:48.983" v="0" actId="18676"/>
+        <pc:sldMkLst>
+          <pc:docMk/>
+          <pc:sldMk cId="0" sldId="279"/>
+        </pc:sldMkLst>
+      </pc:sldChg>
+      <pc:sldChg chg="add del">
+        <pc:chgData name="Mitchell Wand" userId="de9b44c55c049659" providerId="LiveId" clId="{A3C5E289-FD0A-4A2C-B775-A66EDB85EC8C}" dt="2023-09-21T19:07:12.046" v="1"/>
+        <pc:sldMkLst>
+          <pc:docMk/>
+          <pc:sldMk cId="0" sldId="286"/>
+        </pc:sldMkLst>
+      </pc:sldChg>
+      <pc:sldChg chg="add del">
+        <pc:chgData name="Mitchell Wand" userId="de9b44c55c049659" providerId="LiveId" clId="{A3C5E289-FD0A-4A2C-B775-A66EDB85EC8C}" dt="2023-09-21T19:07:12.046" v="1"/>
+        <pc:sldMkLst>
+          <pc:docMk/>
+          <pc:sldMk cId="0" sldId="288"/>
+        </pc:sldMkLst>
+      </pc:sldChg>
+      <pc:sldChg chg="add del">
+        <pc:chgData name="Mitchell Wand" userId="de9b44c55c049659" providerId="LiveId" clId="{A3C5E289-FD0A-4A2C-B775-A66EDB85EC8C}" dt="2023-09-21T19:07:12.046" v="1"/>
+        <pc:sldMkLst>
+          <pc:docMk/>
+          <pc:sldMk cId="0" sldId="289"/>
+        </pc:sldMkLst>
+      </pc:sldChg>
+      <pc:sldChg chg="add del">
+        <pc:chgData name="Mitchell Wand" userId="de9b44c55c049659" providerId="LiveId" clId="{A3C5E289-FD0A-4A2C-B775-A66EDB85EC8C}" dt="2023-09-21T19:07:12.046" v="1"/>
+        <pc:sldMkLst>
+          <pc:docMk/>
+          <pc:sldMk cId="0" sldId="290"/>
+        </pc:sldMkLst>
+      </pc:sldChg>
+      <pc:sldChg chg="add del">
+        <pc:chgData name="Mitchell Wand" userId="de9b44c55c049659" providerId="LiveId" clId="{A3C5E289-FD0A-4A2C-B775-A66EDB85EC8C}" dt="2023-09-21T19:07:12.046" v="1"/>
+        <pc:sldMkLst>
+          <pc:docMk/>
+          <pc:sldMk cId="0" sldId="291"/>
+        </pc:sldMkLst>
+      </pc:sldChg>
+      <pc:sldChg chg="add del">
+        <pc:chgData name="Mitchell Wand" userId="de9b44c55c049659" providerId="LiveId" clId="{A3C5E289-FD0A-4A2C-B775-A66EDB85EC8C}" dt="2023-09-21T19:07:12.046" v="1"/>
+        <pc:sldMkLst>
+          <pc:docMk/>
+          <pc:sldMk cId="0" sldId="292"/>
+        </pc:sldMkLst>
+      </pc:sldChg>
+      <pc:sldChg chg="add del">
+        <pc:chgData name="Mitchell Wand" userId="de9b44c55c049659" providerId="LiveId" clId="{A3C5E289-FD0A-4A2C-B775-A66EDB85EC8C}" dt="2023-09-21T19:07:12.046" v="1"/>
+        <pc:sldMkLst>
+          <pc:docMk/>
+          <pc:sldMk cId="0" sldId="293"/>
+        </pc:sldMkLst>
+      </pc:sldChg>
+      <pc:sldChg chg="del">
+        <pc:chgData name="Mitchell Wand" userId="de9b44c55c049659" providerId="LiveId" clId="{A3C5E289-FD0A-4A2C-B775-A66EDB85EC8C}" dt="2023-09-21T19:05:48.983" v="0" actId="18676"/>
+        <pc:sldMkLst>
+          <pc:docMk/>
+          <pc:sldMk cId="0" sldId="294"/>
+        </pc:sldMkLst>
+      </pc:sldChg>
+      <pc:sldChg chg="del">
+        <pc:chgData name="Mitchell Wand" userId="de9b44c55c049659" providerId="LiveId" clId="{A3C5E289-FD0A-4A2C-B775-A66EDB85EC8C}" dt="2023-09-21T19:05:48.983" v="0" actId="18676"/>
+        <pc:sldMkLst>
+          <pc:docMk/>
+          <pc:sldMk cId="2813158976" sldId="296"/>
+        </pc:sldMkLst>
+      </pc:sldChg>
+      <pc:sldChg chg="add del">
+        <pc:chgData name="Mitchell Wand" userId="de9b44c55c049659" providerId="LiveId" clId="{A3C5E289-FD0A-4A2C-B775-A66EDB85EC8C}" dt="2023-09-21T19:07:12.046" v="1"/>
+        <pc:sldMkLst>
+          <pc:docMk/>
+          <pc:sldMk cId="2690522714" sldId="386"/>
+        </pc:sldMkLst>
+      </pc:sldChg>
+      <pc:sldChg chg="del">
+        <pc:chgData name="Mitchell Wand" userId="de9b44c55c049659" providerId="LiveId" clId="{A3C5E289-FD0A-4A2C-B775-A66EDB85EC8C}" dt="2023-09-21T19:05:48.983" v="0" actId="18676"/>
+        <pc:sldMkLst>
+          <pc:docMk/>
+          <pc:sldMk cId="1712348606" sldId="387"/>
+        </pc:sldMkLst>
+      </pc:sldChg>
+      <pc:sldChg chg="del">
+        <pc:chgData name="Mitchell Wand" userId="de9b44c55c049659" providerId="LiveId" clId="{A3C5E289-FD0A-4A2C-B775-A66EDB85EC8C}" dt="2023-09-21T19:05:48.983" v="0" actId="18676"/>
+        <pc:sldMkLst>
+          <pc:docMk/>
+          <pc:sldMk cId="4105083793" sldId="388"/>
+        </pc:sldMkLst>
+      </pc:sldChg>
+      <pc:sldChg chg="del">
+        <pc:chgData name="Mitchell Wand" userId="de9b44c55c049659" providerId="LiveId" clId="{A3C5E289-FD0A-4A2C-B775-A66EDB85EC8C}" dt="2023-09-21T19:05:48.983" v="0" actId="18676"/>
+        <pc:sldMkLst>
+          <pc:docMk/>
+          <pc:sldMk cId="2457656915" sldId="389"/>
+        </pc:sldMkLst>
+      </pc:sldChg>
+      <pc:sldChg chg="del">
+        <pc:chgData name="Mitchell Wand" userId="de9b44c55c049659" providerId="LiveId" clId="{A3C5E289-FD0A-4A2C-B775-A66EDB85EC8C}" dt="2023-09-21T19:05:48.983" v="0" actId="18676"/>
+        <pc:sldMkLst>
+          <pc:docMk/>
+          <pc:sldMk cId="4204086104" sldId="390"/>
+        </pc:sldMkLst>
+      </pc:sldChg>
+      <pc:sldChg chg="del">
+        <pc:chgData name="Mitchell Wand" userId="de9b44c55c049659" providerId="LiveId" clId="{A3C5E289-FD0A-4A2C-B775-A66EDB85EC8C}" dt="2023-09-21T19:05:48.983" v="0" actId="18676"/>
+        <pc:sldMkLst>
+          <pc:docMk/>
+          <pc:sldMk cId="3646889748" sldId="391"/>
+        </pc:sldMkLst>
+      </pc:sldChg>
+      <pc:sldChg chg="del">
+        <pc:chgData name="Mitchell Wand" userId="de9b44c55c049659" providerId="LiveId" clId="{A3C5E289-FD0A-4A2C-B775-A66EDB85EC8C}" dt="2023-09-21T19:05:48.983" v="0" actId="18676"/>
+        <pc:sldMkLst>
+          <pc:docMk/>
+          <pc:sldMk cId="2936127610" sldId="393"/>
+        </pc:sldMkLst>
+      </pc:sldChg>
+      <pc:sldChg chg="del">
+        <pc:chgData name="Mitchell Wand" userId="de9b44c55c049659" providerId="LiveId" clId="{A3C5E289-FD0A-4A2C-B775-A66EDB85EC8C}" dt="2023-09-21T19:05:48.983" v="0" actId="18676"/>
+        <pc:sldMkLst>
+          <pc:docMk/>
+          <pc:sldMk cId="3959368631" sldId="395"/>
+        </pc:sldMkLst>
+      </pc:sldChg>
+      <pc:sldChg chg="del">
+        <pc:chgData name="Mitchell Wand" userId="de9b44c55c049659" providerId="LiveId" clId="{A3C5E289-FD0A-4A2C-B775-A66EDB85EC8C}" dt="2023-09-21T19:05:48.983" v="0" actId="18676"/>
+        <pc:sldMkLst>
+          <pc:docMk/>
+          <pc:sldMk cId="731707150" sldId="396"/>
+        </pc:sldMkLst>
+      </pc:sldChg>
+      <pc:sldChg chg="del">
+        <pc:chgData name="Mitchell Wand" userId="de9b44c55c049659" providerId="LiveId" clId="{A3C5E289-FD0A-4A2C-B775-A66EDB85EC8C}" dt="2023-09-21T19:05:48.983" v="0" actId="18676"/>
+        <pc:sldMkLst>
+          <pc:docMk/>
+          <pc:sldMk cId="448131492" sldId="397"/>
+        </pc:sldMkLst>
+      </pc:sldChg>
+      <pc:sldChg chg="del">
+        <pc:chgData name="Mitchell Wand" userId="de9b44c55c049659" providerId="LiveId" clId="{A3C5E289-FD0A-4A2C-B775-A66EDB85EC8C}" dt="2023-09-21T19:05:48.983" v="0" actId="18676"/>
+        <pc:sldMkLst>
+          <pc:docMk/>
+          <pc:sldMk cId="2865064717" sldId="398"/>
+        </pc:sldMkLst>
+      </pc:sldChg>
+      <pc:sldChg chg="del">
+        <pc:chgData name="Mitchell Wand" userId="de9b44c55c049659" providerId="LiveId" clId="{A3C5E289-FD0A-4A2C-B775-A66EDB85EC8C}" dt="2023-09-21T19:05:48.983" v="0" actId="18676"/>
+        <pc:sldMkLst>
+          <pc:docMk/>
+          <pc:sldMk cId="406903797" sldId="399"/>
+        </pc:sldMkLst>
+      </pc:sldChg>
+      <pc:sldChg chg="del">
+        <pc:chgData name="Mitchell Wand" userId="de9b44c55c049659" providerId="LiveId" clId="{A3C5E289-FD0A-4A2C-B775-A66EDB85EC8C}" dt="2023-09-21T19:05:48.983" v="0" actId="18676"/>
+        <pc:sldMkLst>
+          <pc:docMk/>
+          <pc:sldMk cId="1631386980" sldId="400"/>
+        </pc:sldMkLst>
+      </pc:sldChg>
+      <pc:sldChg chg="del">
+        <pc:chgData name="Mitchell Wand" userId="de9b44c55c049659" providerId="LiveId" clId="{A3C5E289-FD0A-4A2C-B775-A66EDB85EC8C}" dt="2023-09-21T19:05:48.983" v="0" actId="18676"/>
+        <pc:sldMkLst>
+          <pc:docMk/>
+          <pc:sldMk cId="581266231" sldId="401"/>
+        </pc:sldMkLst>
+      </pc:sldChg>
+      <pc:sldChg chg="del">
+        <pc:chgData name="Mitchell Wand" userId="de9b44c55c049659" providerId="LiveId" clId="{A3C5E289-FD0A-4A2C-B775-A66EDB85EC8C}" dt="2023-09-21T19:05:48.983" v="0" actId="18676"/>
+        <pc:sldMkLst>
+          <pc:docMk/>
+          <pc:sldMk cId="1352059909" sldId="402"/>
+        </pc:sldMkLst>
+      </pc:sldChg>
+      <pc:sldChg chg="del">
+        <pc:chgData name="Mitchell Wand" userId="de9b44c55c049659" providerId="LiveId" clId="{A3C5E289-FD0A-4A2C-B775-A66EDB85EC8C}" dt="2023-09-21T19:05:48.983" v="0" actId="18676"/>
+        <pc:sldMkLst>
+          <pc:docMk/>
+          <pc:sldMk cId="424888832" sldId="403"/>
+        </pc:sldMkLst>
+      </pc:sldChg>
+      <pc:sldChg chg="modSp mod">
+        <pc:chgData name="Mitchell Wand" userId="de9b44c55c049659" providerId="LiveId" clId="{A3C5E289-FD0A-4A2C-B775-A66EDB85EC8C}" dt="2023-09-21T19:08:02.826" v="3"/>
+        <pc:sldMkLst>
+          <pc:docMk/>
+          <pc:sldMk cId="2060496032" sldId="405"/>
+        </pc:sldMkLst>
+        <pc:spChg chg="mod">
+          <ac:chgData name="Mitchell Wand" userId="de9b44c55c049659" providerId="LiveId" clId="{A3C5E289-FD0A-4A2C-B775-A66EDB85EC8C}" dt="2023-09-21T19:08:02.826" v="3"/>
+          <ac:spMkLst>
+            <pc:docMk/>
+            <pc:sldMk cId="2060496032" sldId="405"/>
+            <ac:spMk id="3" creationId="{9BEC0C84-159D-289A-AB37-71EDCED09F3D}"/>
+          </ac:spMkLst>
+        </pc:spChg>
+      </pc:sldChg>
+      <pc:sldChg chg="modSp mod">
+        <pc:chgData name="Mitchell Wand" userId="de9b44c55c049659" providerId="LiveId" clId="{A3C5E289-FD0A-4A2C-B775-A66EDB85EC8C}" dt="2023-09-21T19:08:19.001" v="5"/>
+        <pc:sldMkLst>
+          <pc:docMk/>
+          <pc:sldMk cId="2363062081" sldId="425"/>
+        </pc:sldMkLst>
+        <pc:spChg chg="mod">
+          <ac:chgData name="Mitchell Wand" userId="de9b44c55c049659" providerId="LiveId" clId="{A3C5E289-FD0A-4A2C-B775-A66EDB85EC8C}" dt="2023-09-21T19:08:19.001" v="5"/>
+          <ac:spMkLst>
+            <pc:docMk/>
+            <pc:sldMk cId="2363062081" sldId="425"/>
+            <ac:spMk id="3" creationId="{9BEC0C84-159D-289A-AB37-71EDCED09F3D}"/>
+          </ac:spMkLst>
+        </pc:spChg>
+      </pc:sldChg>
+      <pc:sldMasterChg chg="delSldLayout">
+        <pc:chgData name="Mitchell Wand" userId="de9b44c55c049659" providerId="LiveId" clId="{A3C5E289-FD0A-4A2C-B775-A66EDB85EC8C}" dt="2023-09-21T19:05:48.983" v="0" actId="18676"/>
+        <pc:sldMasterMkLst>
+          <pc:docMk/>
+          <pc:sldMasterMk cId="0" sldId="2147483648"/>
+        </pc:sldMasterMkLst>
+        <pc:sldLayoutChg chg="del">
+          <pc:chgData name="Mitchell Wand" userId="de9b44c55c049659" providerId="LiveId" clId="{A3C5E289-FD0A-4A2C-B775-A66EDB85EC8C}" dt="2023-09-21T19:05:48.983" v="0" actId="18676"/>
+          <pc:sldLayoutMkLst>
+            <pc:docMk/>
+            <pc:sldMasterMk cId="0" sldId="2147483648"/>
+            <pc:sldLayoutMk cId="0" sldId="2147483652"/>
+          </pc:sldLayoutMkLst>
+        </pc:sldLayoutChg>
+      </pc:sldMasterChg>
+    </pc:docChg>
+  </pc:docChgLst>
+  <pc:docChgLst>
     <pc:chgData name="Mitchell Wand" userId="de9b44c55c049659" providerId="LiveId" clId="{97F6A37B-697C-4290-A1B5-0CB4BB45D11B}"/>
     <pc:docChg chg="undo custSel addSld delSld modSld sldOrd modSection">
       <pc:chgData name="Mitchell Wand" userId="de9b44c55c049659" providerId="LiveId" clId="{97F6A37B-697C-4290-A1B5-0CB4BB45D11B}" dt="2024-09-29T13:01:24.739" v="2809" actId="20577"/>
@@ -6411,7 +6411,7 @@
           <a:p>
             <a:fld id="{07C7BFD4-467E-4EDE-93EA-052F5B39A4E5}" type="datetime1">
               <a:rPr lang="en-US" smtClean="0"/>
-              <a:t>9/29/2024</a:t>
+              <a:t>10/5/2024</a:t>
             </a:fld>
             <a:endParaRPr lang="en-US"/>
           </a:p>
@@ -8951,7 +8951,7 @@
             </a:r>
             <a:r>
               <a:rPr lang="en-US" dirty="0"/>
-              <a:t>3-24</a:t>
+              <a:t>4</a:t>
             </a:r>
             <a:r>
               <a:rPr dirty="0"/>
@@ -12109,7 +12109,7 @@
                 <a:effectLst/>
                 <a:latin typeface="Consolas" panose="020B0609020204030204" pitchFamily="49" charset="0"/>
               </a:rPr>
-              <a:t>// runs on every render</a:t>
+              <a:t>// runs when n or m changes</a:t>
             </a:r>
             <a:endParaRPr lang="en-US" sz="1400" b="0" dirty="0">
               <a:solidFill>
@@ -12250,17 +12250,37 @@
                 <a:effectLst/>
                 <a:latin typeface="Consolas" panose="020B0609020204030204" pitchFamily="49" charset="0"/>
               </a:rPr>
-              <a:t> #3A is called on every render'</a:t>
-            </a:r>
-            <a:r>
-              <a:rPr lang="en-US" sz="1400" b="0" dirty="0">
-                <a:solidFill>
-                  <a:srgbClr val="000000"/>
-                </a:solidFill>
-                <a:effectLst/>
-                <a:latin typeface="Consolas" panose="020B0609020204030204" pitchFamily="49" charset="0"/>
-              </a:rPr>
-              <a:t>)})</a:t>
+              <a:t> #2MN is run when m or n changes’</a:t>
+            </a:r>
+            <a:r>
+              <a:rPr lang="en-US" sz="1400" b="0" dirty="0">
+                <a:solidFill>
+                  <a:srgbClr val="000000"/>
+                </a:solidFill>
+                <a:effectLst/>
+                <a:latin typeface="Consolas" panose="020B0609020204030204" pitchFamily="49" charset="0"/>
+              </a:rPr>
+              <a:t>)}, [</a:t>
+            </a:r>
+            <a:r>
+              <a:rPr lang="en-US" sz="1400" b="0" dirty="0" err="1">
+                <a:solidFill>
+                  <a:srgbClr val="0070C1"/>
+                </a:solidFill>
+                <a:effectLst/>
+                <a:latin typeface="Consolas" panose="020B0609020204030204" pitchFamily="49" charset="0"/>
+              </a:rPr>
+              <a:t>m,n</a:t>
+            </a:r>
+            <a:r>
+              <a:rPr lang="en-US" sz="1400" b="0" dirty="0">
+                <a:solidFill>
+                  <a:srgbClr val="000000"/>
+                </a:solidFill>
+                <a:effectLst/>
+                <a:latin typeface="Consolas" panose="020B0609020204030204" pitchFamily="49" charset="0"/>
+              </a:rPr>
+              <a:t>])</a:t>
             </a:r>
           </a:p>
           <a:p>
@@ -14200,10 +14220,10 @@
       </p:sp>
       <p:pic>
         <p:nvPicPr>
-          <p:cNvPr id="5" name="Picture 4">
+          <p:cNvPr id="8" name="Picture 7">
             <a:extLst>
               <a:ext uri="{FF2B5EF4-FFF2-40B4-BE49-F238E27FC236}">
-                <a16:creationId xmlns:a16="http://schemas.microsoft.com/office/drawing/2014/main" id="{2C4F288C-ADBE-D863-24A3-6B2814863D39}"/>
+                <a16:creationId xmlns:a16="http://schemas.microsoft.com/office/drawing/2014/main" id="{1690B66E-55D7-2A39-FBD1-BAA594CC1B8C}"/>
               </a:ext>
             </a:extLst>
           </p:cNvPr>
@@ -14220,8 +14240,8 @@
         </p:blipFill>
         <p:spPr>
           <a:xfrm>
-            <a:off x="0" y="1676741"/>
-            <a:ext cx="12192000" cy="4386841"/>
+            <a:off x="0" y="1546161"/>
+            <a:ext cx="12192000" cy="2972463"/>
           </a:xfrm>
           <a:prstGeom prst="rect">
             <a:avLst/>
@@ -14402,31 +14422,6 @@
       </p:grpSpPr>
       <p:sp>
         <p:nvSpPr>
-          <p:cNvPr id="5" name="Title 4">
-            <a:extLst>
-              <a:ext uri="{FF2B5EF4-FFF2-40B4-BE49-F238E27FC236}">
-                <a16:creationId xmlns:a16="http://schemas.microsoft.com/office/drawing/2014/main" id="{91563738-005E-8B76-F936-07E690F33FDB}"/>
-              </a:ext>
-            </a:extLst>
-          </p:cNvPr>
-          <p:cNvSpPr>
-            <a:spLocks noGrp="1"/>
-          </p:cNvSpPr>
-          <p:nvPr>
-            <p:ph type="title"/>
-          </p:nvPr>
-        </p:nvSpPr>
-        <p:spPr/>
-        <p:txBody>
-          <a:bodyPr/>
-          <a:lstStyle/>
-          <a:p>
-            <a:endParaRPr lang="en-US" dirty="0"/>
-          </a:p>
-        </p:txBody>
-      </p:sp>
-      <p:sp>
-        <p:nvSpPr>
           <p:cNvPr id="4" name="Slide Number Placeholder 3">
             <a:extLst>
               <a:ext uri="{FF2B5EF4-FFF2-40B4-BE49-F238E27FC236}">
@@ -15765,6 +15760,34 @@
           </a:p>
         </p:txBody>
       </p:sp>
+      <p:sp>
+        <p:nvSpPr>
+          <p:cNvPr id="3" name="Title 2">
+            <a:extLst>
+              <a:ext uri="{FF2B5EF4-FFF2-40B4-BE49-F238E27FC236}">
+                <a16:creationId xmlns:a16="http://schemas.microsoft.com/office/drawing/2014/main" id="{058EA661-A403-A1C7-4FFF-846E6D8ABB3B}"/>
+              </a:ext>
+            </a:extLst>
+          </p:cNvPr>
+          <p:cNvSpPr>
+            <a:spLocks noGrp="1"/>
+          </p:cNvSpPr>
+          <p:nvPr>
+            <p:ph type="title"/>
+          </p:nvPr>
+        </p:nvSpPr>
+        <p:spPr/>
+        <p:txBody>
+          <a:bodyPr/>
+          <a:lstStyle/>
+          <a:p>
+            <a:r>
+              <a:rPr lang="en-US" dirty="0"/>
+              <a:t>Example</a:t>
+            </a:r>
+          </a:p>
+        </p:txBody>
+      </p:sp>
     </p:spTree>
     <p:extLst>
       <p:ext uri="{BB962C8B-B14F-4D97-AF65-F5344CB8AC3E}">
@@ -15817,7 +15840,10 @@
           <a:bodyPr/>
           <a:lstStyle/>
           <a:p>
-            <a:endParaRPr lang="en-US"/>
+            <a:r>
+              <a:rPr lang="en-US" dirty="0"/>
+              <a:t>Demo</a:t>
+            </a:r>
           </a:p>
         </p:txBody>
       </p:sp>
@@ -15852,10 +15878,10 @@
       </p:sp>
       <p:pic>
         <p:nvPicPr>
-          <p:cNvPr id="5" name="Picture 4">
+          <p:cNvPr id="4" name="Picture 3">
             <a:extLst>
               <a:ext uri="{FF2B5EF4-FFF2-40B4-BE49-F238E27FC236}">
-                <a16:creationId xmlns:a16="http://schemas.microsoft.com/office/drawing/2014/main" id="{8EA3F860-29F9-9A7C-A793-7F2ECE6FF4FB}"/>
+                <a16:creationId xmlns:a16="http://schemas.microsoft.com/office/drawing/2014/main" id="{D005902B-4A4B-86A0-C55C-221445C76851}"/>
               </a:ext>
             </a:extLst>
           </p:cNvPr>
@@ -15872,8 +15898,8 @@
         </p:blipFill>
         <p:spPr>
           <a:xfrm>
-            <a:off x="123092" y="696965"/>
-            <a:ext cx="12192000" cy="5464069"/>
+            <a:off x="132201" y="1523237"/>
+            <a:ext cx="12004713" cy="3752976"/>
           </a:xfrm>
           <a:prstGeom prst="rect">
             <a:avLst/>

</xml_diff>